<commit_message>
modif couleur graphiques powerpoint
</commit_message>
<xml_diff>
--- a/presentation.pptx
+++ b/presentation.pptx
@@ -281,7 +281,7 @@
           <a:p>
             <a:fld id="{85306858-4264-45D8-BEDE-F8D68C272308}" type="datetimeFigureOut">
               <a:rPr lang="fr-FR" smtClean="0"/>
-              <a:t>19/10/2021</a:t>
+              <a:t>21/10/2021</a:t>
             </a:fld>
             <a:endParaRPr lang="fr-FR"/>
           </a:p>
@@ -479,7 +479,7 @@
           <a:p>
             <a:fld id="{85306858-4264-45D8-BEDE-F8D68C272308}" type="datetimeFigureOut">
               <a:rPr lang="fr-FR" smtClean="0"/>
-              <a:t>19/10/2021</a:t>
+              <a:t>21/10/2021</a:t>
             </a:fld>
             <a:endParaRPr lang="fr-FR"/>
           </a:p>
@@ -687,7 +687,7 @@
           <a:p>
             <a:fld id="{85306858-4264-45D8-BEDE-F8D68C272308}" type="datetimeFigureOut">
               <a:rPr lang="fr-FR" smtClean="0"/>
-              <a:t>19/10/2021</a:t>
+              <a:t>21/10/2021</a:t>
             </a:fld>
             <a:endParaRPr lang="fr-FR"/>
           </a:p>
@@ -885,7 +885,7 @@
           <a:p>
             <a:fld id="{85306858-4264-45D8-BEDE-F8D68C272308}" type="datetimeFigureOut">
               <a:rPr lang="fr-FR" smtClean="0"/>
-              <a:t>19/10/2021</a:t>
+              <a:t>21/10/2021</a:t>
             </a:fld>
             <a:endParaRPr lang="fr-FR"/>
           </a:p>
@@ -1160,7 +1160,7 @@
           <a:p>
             <a:fld id="{85306858-4264-45D8-BEDE-F8D68C272308}" type="datetimeFigureOut">
               <a:rPr lang="fr-FR" smtClean="0"/>
-              <a:t>19/10/2021</a:t>
+              <a:t>21/10/2021</a:t>
             </a:fld>
             <a:endParaRPr lang="fr-FR"/>
           </a:p>
@@ -1425,7 +1425,7 @@
           <a:p>
             <a:fld id="{85306858-4264-45D8-BEDE-F8D68C272308}" type="datetimeFigureOut">
               <a:rPr lang="fr-FR" smtClean="0"/>
-              <a:t>19/10/2021</a:t>
+              <a:t>21/10/2021</a:t>
             </a:fld>
             <a:endParaRPr lang="fr-FR"/>
           </a:p>
@@ -1837,7 +1837,7 @@
           <a:p>
             <a:fld id="{85306858-4264-45D8-BEDE-F8D68C272308}" type="datetimeFigureOut">
               <a:rPr lang="fr-FR" smtClean="0"/>
-              <a:t>19/10/2021</a:t>
+              <a:t>21/10/2021</a:t>
             </a:fld>
             <a:endParaRPr lang="fr-FR"/>
           </a:p>
@@ -1978,7 +1978,7 @@
           <a:p>
             <a:fld id="{85306858-4264-45D8-BEDE-F8D68C272308}" type="datetimeFigureOut">
               <a:rPr lang="fr-FR" smtClean="0"/>
-              <a:t>19/10/2021</a:t>
+              <a:t>21/10/2021</a:t>
             </a:fld>
             <a:endParaRPr lang="fr-FR"/>
           </a:p>
@@ -2091,7 +2091,7 @@
           <a:p>
             <a:fld id="{85306858-4264-45D8-BEDE-F8D68C272308}" type="datetimeFigureOut">
               <a:rPr lang="fr-FR" smtClean="0"/>
-              <a:t>19/10/2021</a:t>
+              <a:t>21/10/2021</a:t>
             </a:fld>
             <a:endParaRPr lang="fr-FR"/>
           </a:p>
@@ -2402,7 +2402,7 @@
           <a:p>
             <a:fld id="{85306858-4264-45D8-BEDE-F8D68C272308}" type="datetimeFigureOut">
               <a:rPr lang="fr-FR" smtClean="0"/>
-              <a:t>19/10/2021</a:t>
+              <a:t>21/10/2021</a:t>
             </a:fld>
             <a:endParaRPr lang="fr-FR"/>
           </a:p>
@@ -2690,7 +2690,7 @@
           <a:p>
             <a:fld id="{85306858-4264-45D8-BEDE-F8D68C272308}" type="datetimeFigureOut">
               <a:rPr lang="fr-FR" smtClean="0"/>
-              <a:t>19/10/2021</a:t>
+              <a:t>21/10/2021</a:t>
             </a:fld>
             <a:endParaRPr lang="fr-FR"/>
           </a:p>
@@ -2931,7 +2931,7 @@
           <a:p>
             <a:fld id="{85306858-4264-45D8-BEDE-F8D68C272308}" type="datetimeFigureOut">
               <a:rPr lang="fr-FR" smtClean="0"/>
-              <a:t>19/10/2021</a:t>
+              <a:t>21/10/2021</a:t>
             </a:fld>
             <a:endParaRPr lang="fr-FR"/>
           </a:p>
@@ -6421,10 +6421,10 @@
       </p:sp>
       <p:pic>
         <p:nvPicPr>
-          <p:cNvPr id="3" name="Image 2">
-            <a:extLst>
-              <a:ext uri="{FF2B5EF4-FFF2-40B4-BE49-F238E27FC236}">
-                <a16:creationId xmlns:a16="http://schemas.microsoft.com/office/drawing/2014/main" id="{C30885B9-C6F4-4DBD-8519-2996CFB2B5B5}"/>
+          <p:cNvPr id="4" name="Image 3">
+            <a:extLst>
+              <a:ext uri="{FF2B5EF4-FFF2-40B4-BE49-F238E27FC236}">
+                <a16:creationId xmlns:a16="http://schemas.microsoft.com/office/drawing/2014/main" id="{EE331B03-F497-4DCD-A521-87B2BD9A87F6}"/>
               </a:ext>
             </a:extLst>
           </p:cNvPr>
@@ -6448,7 +6448,7 @@
         <p:spPr>
           <a:xfrm>
             <a:off x="6714865" y="1822385"/>
-            <a:ext cx="5087931" cy="3391953"/>
+            <a:ext cx="5087931" cy="3391954"/>
           </a:xfrm>
           <a:prstGeom prst="rect">
             <a:avLst/>
@@ -8109,7 +8109,7 @@
         <p:spPr>
           <a:xfrm>
             <a:off x="961052" y="1822385"/>
-            <a:ext cx="1159292" cy="3045449"/>
+            <a:ext cx="4137415" cy="3814890"/>
           </a:xfrm>
           <a:prstGeom prst="rect">
             <a:avLst/>
@@ -8133,7 +8133,7 @@
               <a:rPr lang="fr-FR" sz="2000" dirty="0">
                 <a:latin typeface="+mj-lt"/>
               </a:rPr>
-              <a:t>____</a:t>
+              <a:t>Réduction de l’échelle</a:t>
             </a:r>
           </a:p>
           <a:p>
@@ -8148,7 +8148,7 @@
               <a:rPr lang="fr-FR" sz="2000" dirty="0">
                 <a:latin typeface="+mj-lt"/>
               </a:rPr>
-              <a:t>___</a:t>
+              <a:t>Transformation 2D</a:t>
             </a:r>
           </a:p>
           <a:p>
@@ -8163,8 +8163,20 @@
               <a:rPr lang="fr-FR" sz="2000" dirty="0">
                 <a:latin typeface="+mj-lt"/>
               </a:rPr>
-              <a:t>___</a:t>
-            </a:r>
+              <a:t>Sélection temporaire de neurones</a:t>
+            </a:r>
+          </a:p>
+          <a:p>
+            <a:pPr marL="457200" indent="-457200">
+              <a:lnSpc>
+                <a:spcPct val="250000"/>
+              </a:lnSpc>
+              <a:buFont typeface="Arial" panose="020B0604020202020204" pitchFamily="34" charset="0"/>
+              <a:buChar char="•"/>
+            </a:pPr>
+            <a:endParaRPr lang="fr-FR" sz="2000" dirty="0">
+              <a:latin typeface="+mj-lt"/>
+            </a:endParaRPr>
           </a:p>
           <a:p>
             <a:pPr marL="457200" indent="-457200">
@@ -10255,42 +10267,6 @@
           </a:p>
         </p:txBody>
       </p:sp>
-      <p:pic>
-        <p:nvPicPr>
-          <p:cNvPr id="3" name="Image 2">
-            <a:extLst>
-              <a:ext uri="{FF2B5EF4-FFF2-40B4-BE49-F238E27FC236}">
-                <a16:creationId xmlns:a16="http://schemas.microsoft.com/office/drawing/2014/main" id="{C71B8DFF-BD08-461F-8F58-597FAAB3E144}"/>
-              </a:ext>
-            </a:extLst>
-          </p:cNvPr>
-          <p:cNvPicPr>
-            <a:picLocks noChangeAspect="1"/>
-          </p:cNvPicPr>
-          <p:nvPr/>
-        </p:nvPicPr>
-        <p:blipFill>
-          <a:blip r:embed="rId7">
-            <a:extLst>
-              <a:ext uri="{28A0092B-C50C-407E-A947-70E740481C1C}">
-                <a14:useLocalDpi xmlns:a14="http://schemas.microsoft.com/office/drawing/2010/main" val="0"/>
-              </a:ext>
-            </a:extLst>
-          </a:blip>
-          <a:stretch>
-            <a:fillRect/>
-          </a:stretch>
-        </p:blipFill>
-        <p:spPr>
-          <a:xfrm>
-            <a:off x="6316385" y="1822385"/>
-            <a:ext cx="5486411" cy="3657607"/>
-          </a:xfrm>
-          <a:prstGeom prst="rect">
-            <a:avLst/>
-          </a:prstGeom>
-        </p:spPr>
-      </p:pic>
       <p:sp>
         <p:nvSpPr>
           <p:cNvPr id="23" name="ZoneTexte 22">
@@ -10392,6 +10368,42 @@
           </a:p>
         </p:txBody>
       </p:sp>
+      <p:pic>
+        <p:nvPicPr>
+          <p:cNvPr id="7" name="Image 6">
+            <a:extLst>
+              <a:ext uri="{FF2B5EF4-FFF2-40B4-BE49-F238E27FC236}">
+                <a16:creationId xmlns:a16="http://schemas.microsoft.com/office/drawing/2014/main" id="{4954E5B8-3EC0-442D-B069-315C54F7AC46}"/>
+              </a:ext>
+            </a:extLst>
+          </p:cNvPr>
+          <p:cNvPicPr>
+            <a:picLocks noChangeAspect="1"/>
+          </p:cNvPicPr>
+          <p:nvPr/>
+        </p:nvPicPr>
+        <p:blipFill>
+          <a:blip r:embed="rId7">
+            <a:extLst>
+              <a:ext uri="{28A0092B-C50C-407E-A947-70E740481C1C}">
+                <a14:useLocalDpi xmlns:a14="http://schemas.microsoft.com/office/drawing/2010/main" val="0"/>
+              </a:ext>
+            </a:extLst>
+          </a:blip>
+          <a:stretch>
+            <a:fillRect/>
+          </a:stretch>
+        </p:blipFill>
+        <p:spPr>
+          <a:xfrm>
+            <a:off x="6621361" y="1822385"/>
+            <a:ext cx="5181435" cy="3454290"/>
+          </a:xfrm>
+          <a:prstGeom prst="rect">
+            <a:avLst/>
+          </a:prstGeom>
+        </p:spPr>
+      </p:pic>
     </p:spTree>
     <p:extLst>
       <p:ext uri="{BB962C8B-B14F-4D97-AF65-F5344CB8AC3E}">

</xml_diff>